<commit_message>
Adds link to assests and code
</commit_message>
<xml_diff>
--- a/assets/SQL INTECTION.pptx
+++ b/assets/SQL INTECTION.pptx
@@ -14850,6 +14850,10 @@
           </p:nvPr>
         </p:nvSpPr>
         <p:spPr>
+          <a:xfrm>
+            <a:off x="938758" y="382385"/>
+            <a:ext cx="7633742" cy="863091"/>
+          </a:xfrm>
           <a:prstGeom prst="rect">
             <a:avLst/>
           </a:prstGeom>
@@ -14879,10 +14883,10 @@
               <a:buNone/>
             </a:pPr>
             <a:r>
-              <a:rPr lang="en-US"/>
+              <a:rPr lang="en-US" dirty="0"/>
               <a:t>CONT.</a:t>
             </a:r>
-            <a:endParaRPr/>
+            <a:endParaRPr dirty="0"/>
           </a:p>
         </p:txBody>
       </p:sp>
@@ -14897,6 +14901,10 @@
           </p:nvPr>
         </p:nvSpPr>
         <p:spPr>
+          <a:xfrm>
+            <a:off x="938758" y="1245476"/>
+            <a:ext cx="7633742" cy="5612524"/>
+          </a:xfrm>
           <a:prstGeom prst="rect">
             <a:avLst/>
           </a:prstGeom>
@@ -14923,10 +14931,10 @@
               <a:buChar char="◻"/>
             </a:pPr>
             <a:r>
-              <a:rPr lang="en-US" sz="2405"/>
+              <a:rPr lang="en-US" sz="2405" dirty="0"/>
               <a:t>The technique is based on malformed user-supplied data </a:t>
             </a:r>
-            <a:endParaRPr/>
+            <a:endParaRPr dirty="0"/>
           </a:p>
           <a:p>
             <a:pPr marL="320040" lvl="0" indent="-320040" algn="l" rtl="0">
@@ -14941,14 +14949,14 @@
               <a:buChar char="◻"/>
             </a:pPr>
             <a:r>
-              <a:rPr lang="en-US" sz="2405">
+              <a:rPr lang="en-US" sz="2405" dirty="0">
                 <a:solidFill>
                   <a:srgbClr val="262626"/>
                 </a:solidFill>
               </a:rPr>
               <a:t>Transform the innocent SQL calls to a malicious call </a:t>
             </a:r>
-            <a:endParaRPr/>
+            <a:endParaRPr dirty="0"/>
           </a:p>
           <a:p>
             <a:pPr marL="320040" lvl="0" indent="-320040" algn="l" rtl="0">
@@ -14963,10 +14971,10 @@
               <a:buChar char="◻"/>
             </a:pPr>
             <a:r>
-              <a:rPr lang="en-US" sz="2405"/>
+              <a:rPr lang="en-US" sz="2405" dirty="0"/>
               <a:t>Cause unauthorized access, deletion of data, or theft of information</a:t>
             </a:r>
-            <a:endParaRPr/>
+            <a:endParaRPr dirty="0"/>
           </a:p>
           <a:p>
             <a:pPr marL="320040" lvl="0" indent="-320040" algn="l" rtl="0">
@@ -14981,10 +14989,10 @@
               <a:buChar char="◻"/>
             </a:pPr>
             <a:r>
-              <a:rPr lang="en-US" sz="2405"/>
+              <a:rPr lang="en-US" sz="2405" dirty="0"/>
               <a:t>All databases can be a target of SQL injection and all are vulnerable to this technique. </a:t>
             </a:r>
-            <a:endParaRPr/>
+            <a:endParaRPr dirty="0"/>
           </a:p>
           <a:p>
             <a:pPr marL="320040" lvl="0" indent="-320040" algn="l" rtl="0">
@@ -14999,13 +15007,12 @@
               <a:buChar char="◻"/>
             </a:pPr>
             <a:r>
-              <a:rPr lang="en-US" sz="2405"/>
+              <a:rPr lang="en-US" sz="2405" dirty="0"/>
               <a:t>The vulnerability is in the application layer outside of the database, and the moment that the application has a connection into the database.  </a:t>
             </a:r>
-            <a:endParaRPr/>
-          </a:p>
-          <a:p>
-            <a:pPr marL="274320" lvl="0" indent="-162836" algn="l" rtl="0">
+          </a:p>
+          <a:p>
+            <a:pPr marL="320040" lvl="0" indent="-320040" algn="l" rtl="0">
               <a:spcBef>
                 <a:spcPts val="600"/>
               </a:spcBef>
@@ -15013,9 +15020,46 @@
                 <a:spcPts val="0"/>
               </a:spcAft>
               <a:buSzPts val="1756"/>
-              <a:buNone/>
-            </a:pPr>
-            <a:endParaRPr sz="2405"/>
+              <a:buFont typeface="Noto Sans Symbols"/>
+              <a:buChar char="◻"/>
+            </a:pPr>
+            <a:endParaRPr dirty="0"/>
+          </a:p>
+          <a:p>
+            <a:pPr marL="274320" lvl="0" indent="-162836" algn="l" rtl="0">
+              <a:spcBef>
+                <a:spcPts val="600"/>
+              </a:spcBef>
+              <a:spcAft>
+                <a:spcPts val="0"/>
+              </a:spcAft>
+              <a:buSzPts val="1756"/>
+              <a:buNone/>
+            </a:pPr>
+            <a:r>
+              <a:rPr lang="en-US" sz="2405" b="1" dirty="0">
+                <a:solidFill>
+                  <a:schemeClr val="tx1"/>
+                </a:solidFill>
+              </a:rPr>
+              <a:t>Link to all assets &amp; code for this presentation </a:t>
+            </a:r>
+          </a:p>
+          <a:p>
+            <a:pPr marL="274320" lvl="0" indent="-162836">
+              <a:spcBef>
+                <a:spcPts val="600"/>
+              </a:spcBef>
+              <a:buSzPts val="1756"/>
+              <a:buNone/>
+            </a:pPr>
+            <a:r>
+              <a:rPr lang="en-US" sz="2800" dirty="0">
+                <a:hlinkClick r:id="rId3"/>
+              </a:rPr>
+              <a:t>https://github.com/thecodehive/library</a:t>
+            </a:r>
+            <a:endParaRPr sz="2405" b="1" dirty="0"/>
           </a:p>
         </p:txBody>
       </p:sp>

</xml_diff>